<commit_message>
Completed till checkpoint 3
</commit_message>
<xml_diff>
--- a/InvestmentAnalysis/results/Spark Funds Presentation.pptx
+++ b/InvestmentAnalysis/results/Spark Funds Presentation.pptx
@@ -118,10 +118,10 @@
   </p:defaultTextStyle>
   <p:extLst>
     <p:ext uri="{EFAFB233-063F-42B5-8137-9DF3F51BA10A}">
-      <p15:sldGuideLst xmlns:p15="http://schemas.microsoft.com/office/powerpoint/2012/main"/>
+      <p15:sldGuideLst xmlns:p15="http://schemas.microsoft.com/office/powerpoint/2012/main" xmlns=""/>
     </p:ext>
     <p:ext uri="{2D200454-40CA-4A62-9FC3-DE9A4176ACB9}">
-      <p15:notesGuideLst xmlns:p15="http://schemas.microsoft.com/office/powerpoint/2012/main"/>
+      <p15:notesGuideLst xmlns:p15="http://schemas.microsoft.com/office/powerpoint/2012/main" xmlns=""/>
     </p:ext>
   </p:extLst>
 </p:presentation>
@@ -209,7 +209,7 @@
           <a:p>
             <a:fld id="{2E309023-AF2B-4043-B228-F191CADC9BB1}" type="datetimeFigureOut">
               <a:rPr lang="en-IN" smtClean="0"/>
-              <a:t>06-04-2017</a:t>
+              <a:t>01-05-2018</a:t>
             </a:fld>
             <a:endParaRPr lang="en-IN"/>
           </a:p>
@@ -608,7 +608,7 @@
           <a:p>
             <a:fld id="{70C018FE-C8D6-4A9C-A702-41F1E0C1C452}" type="datetimeFigureOut">
               <a:rPr lang="en-IN" smtClean="0"/>
-              <a:t>06-04-2017</a:t>
+              <a:t>01-05-2018</a:t>
             </a:fld>
             <a:endParaRPr lang="en-IN"/>
           </a:p>
@@ -778,7 +778,7 @@
           <a:p>
             <a:fld id="{70C018FE-C8D6-4A9C-A702-41F1E0C1C452}" type="datetimeFigureOut">
               <a:rPr lang="en-IN" smtClean="0"/>
-              <a:t>06-04-2017</a:t>
+              <a:t>01-05-2018</a:t>
             </a:fld>
             <a:endParaRPr lang="en-IN"/>
           </a:p>
@@ -958,7 +958,7 @@
           <a:p>
             <a:fld id="{70C018FE-C8D6-4A9C-A702-41F1E0C1C452}" type="datetimeFigureOut">
               <a:rPr lang="en-IN" smtClean="0"/>
-              <a:t>06-04-2017</a:t>
+              <a:t>01-05-2018</a:t>
             </a:fld>
             <a:endParaRPr lang="en-IN"/>
           </a:p>
@@ -1390,7 +1390,7 @@
           <a:p>
             <a:fld id="{70C018FE-C8D6-4A9C-A702-41F1E0C1C452}" type="datetimeFigureOut">
               <a:rPr lang="en-IN" smtClean="0"/>
-              <a:t>06-04-2017</a:t>
+              <a:t>01-05-2018</a:t>
             </a:fld>
             <a:endParaRPr lang="en-IN"/>
           </a:p>
@@ -1622,7 +1622,7 @@
           <a:p>
             <a:fld id="{70C018FE-C8D6-4A9C-A702-41F1E0C1C452}" type="datetimeFigureOut">
               <a:rPr lang="en-IN" smtClean="0"/>
-              <a:t>06-04-2017</a:t>
+              <a:t>01-05-2018</a:t>
             </a:fld>
             <a:endParaRPr lang="en-IN"/>
           </a:p>
@@ -1989,7 +1989,7 @@
           <a:p>
             <a:fld id="{70C018FE-C8D6-4A9C-A702-41F1E0C1C452}" type="datetimeFigureOut">
               <a:rPr lang="en-IN" smtClean="0"/>
-              <a:t>06-04-2017</a:t>
+              <a:t>01-05-2018</a:t>
             </a:fld>
             <a:endParaRPr lang="en-IN"/>
           </a:p>
@@ -2107,7 +2107,7 @@
           <a:p>
             <a:fld id="{70C018FE-C8D6-4A9C-A702-41F1E0C1C452}" type="datetimeFigureOut">
               <a:rPr lang="en-IN" smtClean="0"/>
-              <a:t>06-04-2017</a:t>
+              <a:t>01-05-2018</a:t>
             </a:fld>
             <a:endParaRPr lang="en-IN"/>
           </a:p>
@@ -2202,7 +2202,7 @@
           <a:p>
             <a:fld id="{70C018FE-C8D6-4A9C-A702-41F1E0C1C452}" type="datetimeFigureOut">
               <a:rPr lang="en-IN" smtClean="0"/>
-              <a:t>06-04-2017</a:t>
+              <a:t>01-05-2018</a:t>
             </a:fld>
             <a:endParaRPr lang="en-IN"/>
           </a:p>
@@ -2478,7 +2478,7 @@
           <a:p>
             <a:fld id="{70C018FE-C8D6-4A9C-A702-41F1E0C1C452}" type="datetimeFigureOut">
               <a:rPr lang="en-IN" smtClean="0"/>
-              <a:t>06-04-2017</a:t>
+              <a:t>01-05-2018</a:t>
             </a:fld>
             <a:endParaRPr lang="en-IN"/>
           </a:p>
@@ -2735,7 +2735,7 @@
           <a:p>
             <a:fld id="{70C018FE-C8D6-4A9C-A702-41F1E0C1C452}" type="datetimeFigureOut">
               <a:rPr lang="en-IN" smtClean="0"/>
-              <a:t>06-04-2017</a:t>
+              <a:t>01-05-2018</a:t>
             </a:fld>
             <a:endParaRPr lang="en-IN"/>
           </a:p>
@@ -2946,7 +2946,7 @@
           <a:p>
             <a:fld id="{70C018FE-C8D6-4A9C-A702-41F1E0C1C452}" type="datetimeFigureOut">
               <a:rPr lang="en-IN" smtClean="0"/>
-              <a:t>06-04-2017</a:t>
+              <a:t>01-05-2018</a:t>
             </a:fld>
             <a:endParaRPr lang="en-IN" dirty="0"/>
           </a:p>
@@ -3041,7 +3041,7 @@
           <p:nvPr userDrawn="1"/>
         </p:nvPicPr>
         <p:blipFill>
-          <a:blip r:embed="rId13">
+          <a:blip r:embed="rId13" cstate="print">
             <a:extLst>
               <a:ext uri="{28A0092B-C50C-407E-A947-70E740481C1C}">
                 <a14:useLocalDpi xmlns:a14="http://schemas.microsoft.com/office/drawing/2010/main" val="0"/>
@@ -3465,6 +3465,10 @@
             <a:br>
               <a:rPr lang="en-IN" sz="2800" dirty="0"/>
             </a:br>
+            <a:r>
+              <a:rPr lang="en-IN" sz="2800" dirty="0"/>
+              <a:t/>
+            </a:r>
             <a:br>
               <a:rPr lang="en-IN" sz="2800" dirty="0"/>
             </a:br>
@@ -3493,65 +3497,38 @@
         </p:spPr>
         <p:txBody>
           <a:bodyPr>
-            <a:normAutofit fontScale="92500" lnSpcReduction="20000"/>
+            <a:normAutofit/>
           </a:bodyPr>
           <a:lstStyle/>
           <a:p>
             <a:pPr algn="l"/>
             <a:r>
-              <a:rPr lang="en-IN" sz="1200" dirty="0"/>
-              <a:t> </a:t>
-            </a:r>
+              <a:rPr lang="en-IN" sz="1800" dirty="0" smtClean="0"/>
+              <a:t>Member name</a:t>
+            </a:r>
+            <a:r>
+              <a:rPr lang="en-IN" sz="1800" dirty="0" smtClean="0"/>
+              <a:t>:</a:t>
+            </a:r>
+          </a:p>
+          <a:p>
+            <a:pPr algn="l"/>
             <a:r>
               <a:rPr lang="en-IN" sz="1800" dirty="0"/>
-              <a:t>Group Name:</a:t>
-            </a:r>
-          </a:p>
-          <a:p>
-            <a:pPr marL="457200" indent="-457200" algn="l">
-              <a:buFont typeface="+mj-lt"/>
-              <a:buAutoNum type="arabicPeriod"/>
-            </a:pPr>
-            <a:r>
-              <a:rPr lang="en-IN" sz="1800" dirty="0"/>
-              <a:t> Member name</a:t>
-            </a:r>
-          </a:p>
-          <a:p>
-            <a:pPr marL="457200" indent="-457200" algn="l">
-              <a:buFont typeface="+mj-lt"/>
-              <a:buAutoNum type="arabicPeriod"/>
-            </a:pPr>
-            <a:r>
-              <a:rPr lang="en-IN" sz="1800" dirty="0"/>
-              <a:t> Member name</a:t>
-            </a:r>
-          </a:p>
-          <a:p>
-            <a:pPr marL="457200" indent="-457200" algn="l">
-              <a:buFont typeface="+mj-lt"/>
-              <a:buAutoNum type="arabicPeriod"/>
-            </a:pPr>
-            <a:r>
-              <a:rPr lang="en-IN" sz="1800" dirty="0"/>
-              <a:t> Member name</a:t>
-            </a:r>
-          </a:p>
-          <a:p>
-            <a:pPr marL="457200" indent="-457200" algn="l">
-              <a:buFont typeface="+mj-lt"/>
-              <a:buAutoNum type="arabicPeriod"/>
-            </a:pPr>
-            <a:r>
-              <a:rPr lang="en-IN" sz="1800" dirty="0"/>
-              <a:t> Member name</a:t>
-            </a:r>
-          </a:p>
-          <a:p>
-            <a:pPr marL="457200" indent="-457200" algn="l">
-              <a:buFont typeface="+mj-lt"/>
-              <a:buAutoNum type="arabicPeriod"/>
-            </a:pPr>
+              <a:t>	</a:t>
+            </a:r>
+            <a:r>
+              <a:rPr lang="en-IN" sz="1800" dirty="0" smtClean="0"/>
+              <a:t>Naveen </a:t>
+            </a:r>
+            <a:r>
+              <a:rPr lang="en-IN" sz="1800" dirty="0" err="1" smtClean="0"/>
+              <a:t>Bharadwaj</a:t>
+            </a:r>
+            <a:r>
+              <a:rPr lang="en-IN" sz="1800" dirty="0" smtClean="0"/>
+              <a:t> N</a:t>
+            </a:r>
             <a:endParaRPr lang="en-IN" sz="1800" dirty="0"/>
           </a:p>
         </p:txBody>
@@ -4374,7 +4351,7 @@
     </a:clrScheme>
     <a:fontScheme name="Office Theme">
       <a:majorFont>
-        <a:latin typeface="Calibri Light" panose="020F0302020204030204"/>
+        <a:latin typeface="Calibri Light"/>
         <a:ea typeface=""/>
         <a:cs typeface=""/>
         <a:font script="Jpan" typeface="游ゴシック Light"/>
@@ -4409,7 +4386,7 @@
         <a:font script="Geor" typeface="Sylfaen"/>
       </a:majorFont>
       <a:minorFont>
-        <a:latin typeface="Calibri" panose="020F0502020204030204"/>
+        <a:latin typeface="Calibri"/>
         <a:ea typeface=""/>
         <a:cs typeface=""/>
         <a:font script="Jpan" typeface="游ゴシック"/>
@@ -4586,7 +4563,7 @@
   <a:extraClrSchemeLst/>
   <a:extLst>
     <a:ext uri="{05A4C25C-085E-4340-85A3-A5531E510DB2}">
-      <thm15:themeFamily xmlns:thm15="http://schemas.microsoft.com/office/thememl/2012/main" name="Office Theme" id="{62F939B6-93AF-4DB8-9C6B-D6C7DFDC589F}" vid="{4A3C46E8-61CC-4603-A589-7422A47A8E4A}"/>
+      <thm15:themeFamily xmlns:thm15="http://schemas.microsoft.com/office/thememl/2012/main" xmlns="" name="Office Theme" id="{62F939B6-93AF-4DB8-9C6B-D6C7DFDC589F}" vid="{4A3C46E8-61CC-4603-A589-7422A47A8E4A}"/>
     </a:ext>
   </a:extLst>
 </a:theme>
@@ -4635,7 +4612,7 @@
     </a:clrScheme>
     <a:fontScheme name="Office">
       <a:majorFont>
-        <a:latin typeface="Calibri Light" panose="020F0302020204030204"/>
+        <a:latin typeface="Calibri Light"/>
         <a:ea typeface=""/>
         <a:cs typeface=""/>
         <a:font script="Jpan" typeface="游ゴシック Light"/>
@@ -4687,7 +4664,7 @@
         <a:font script="Tfng" typeface="Ebrima"/>
       </a:majorFont>
       <a:minorFont>
-        <a:latin typeface="Calibri" panose="020F0502020204030204"/>
+        <a:latin typeface="Calibri"/>
         <a:ea typeface=""/>
         <a:cs typeface=""/>
         <a:font script="Jpan" typeface="游ゴシック"/>
@@ -4881,7 +4858,7 @@
   <a:extraClrSchemeLst/>
   <a:extLst>
     <a:ext uri="{05A4C25C-085E-4340-85A3-A5531E510DB2}">
-      <thm15:themeFamily xmlns:thm15="http://schemas.microsoft.com/office/thememl/2012/main" name="Office Theme" id="{62F939B6-93AF-4DB8-9C6B-D6C7DFDC589F}" vid="{4A3C46E8-61CC-4603-A589-7422A47A8E4A}"/>
+      <thm15:themeFamily xmlns:thm15="http://schemas.microsoft.com/office/thememl/2012/main" xmlns="" name="Office Theme" id="{62F939B6-93AF-4DB8-9C6B-D6C7DFDC589F}" vid="{4A3C46E8-61CC-4603-A589-7422A47A8E4A}"/>
     </a:ext>
   </a:extLst>
 </a:theme>

</xml_diff>